<commit_message>
Alteration made to product scene in unity
</commit_message>
<xml_diff>
--- a/CIP.pptx
+++ b/CIP.pptx
@@ -289,7 +289,7 @@
             <a:fld id="{11A6662E-FAF4-44BC-88B5-85A7CBFB6D30}" type="datetime1">
               <a:rPr lang="en-US" smtClean="0"/>
               <a:pPr/>
-              <a:t>3/2/2021</a:t>
+              <a:t>4/21/2021</a:t>
             </a:fld>
             <a:endParaRPr lang="en-US" dirty="0"/>
           </a:p>
@@ -516,7 +516,7 @@
           <a:p>
             <a:fld id="{4C559632-1575-4E14-B53B-3DC3D5ED3947}" type="datetime1">
               <a:rPr lang="en-US" smtClean="0"/>
-              <a:t>3/2/2021</a:t>
+              <a:t>4/21/2021</a:t>
             </a:fld>
             <a:endParaRPr lang="en-US"/>
           </a:p>
@@ -724,7 +724,7 @@
           <a:p>
             <a:fld id="{CC4A6868-2568-4CC9-B302-F37117B01A6E}" type="datetime1">
               <a:rPr lang="en-US" smtClean="0"/>
-              <a:t>3/2/2021</a:t>
+              <a:t>4/21/2021</a:t>
             </a:fld>
             <a:endParaRPr lang="en-US"/>
           </a:p>
@@ -929,7 +929,7 @@
           <a:p>
             <a:fld id="{0055F08A-1E71-4B2B-BB49-E743F2903911}" type="datetime1">
               <a:rPr lang="en-US" smtClean="0"/>
-              <a:t>3/2/2021</a:t>
+              <a:t>4/21/2021</a:t>
             </a:fld>
             <a:endParaRPr lang="en-US" dirty="0"/>
           </a:p>
@@ -1203,7 +1203,7 @@
           <a:p>
             <a:fld id="{15417D9E-721A-44BB-8863-9873FE64DA75}" type="datetime1">
               <a:rPr lang="en-US" smtClean="0"/>
-              <a:t>3/2/2021</a:t>
+              <a:t>4/21/2021</a:t>
             </a:fld>
             <a:endParaRPr lang="en-US"/>
           </a:p>
@@ -1476,7 +1476,7 @@
           <a:p>
             <a:fld id="{5F31DA2F-80B8-49CF-99FB-5ABCA53A607A}" type="datetime1">
               <a:rPr lang="en-US" smtClean="0"/>
-              <a:t>3/2/2021</a:t>
+              <a:t>4/21/2021</a:t>
             </a:fld>
             <a:endParaRPr lang="en-US"/>
           </a:p>
@@ -1891,7 +1891,7 @@
           <a:p>
             <a:fld id="{28852172-E6C9-4B6C-929A-A9DE3837BBF1}" type="datetime1">
               <a:rPr lang="en-US" smtClean="0"/>
-              <a:t>3/2/2021</a:t>
+              <a:t>4/21/2021</a:t>
             </a:fld>
             <a:endParaRPr lang="en-US"/>
           </a:p>
@@ -2043,7 +2043,7 @@
           <a:p>
             <a:fld id="{3AB41CFF-90C9-47B3-9DA1-F2BF8D839F7E}" type="datetime1">
               <a:rPr lang="en-US" smtClean="0"/>
-              <a:t>3/2/2021</a:t>
+              <a:t>4/21/2021</a:t>
             </a:fld>
             <a:endParaRPr lang="en-US"/>
           </a:p>
@@ -2156,7 +2156,7 @@
           <a:p>
             <a:fld id="{F06048FA-06AB-4884-A69B-986B96E68A24}" type="datetime1">
               <a:rPr lang="en-US" smtClean="0"/>
-              <a:t>3/2/2021</a:t>
+              <a:t>4/21/2021</a:t>
             </a:fld>
             <a:endParaRPr lang="en-US"/>
           </a:p>
@@ -2467,7 +2467,7 @@
           <a:p>
             <a:fld id="{50DB7ABA-0172-4F9C-889D-567164F66BCD}" type="datetime1">
               <a:rPr lang="en-US" smtClean="0"/>
-              <a:t>3/2/2021</a:t>
+              <a:t>4/21/2021</a:t>
             </a:fld>
             <a:endParaRPr lang="en-US"/>
           </a:p>
@@ -2758,7 +2758,7 @@
           <a:p>
             <a:fld id="{78AC6A5B-8AE7-4A41-B5A7-9ADC6686DC18}" type="datetime1">
               <a:rPr lang="en-US" smtClean="0"/>
-              <a:t>3/2/2021</a:t>
+              <a:t>4/21/2021</a:t>
             </a:fld>
             <a:endParaRPr lang="en-US"/>
           </a:p>
@@ -3067,7 +3067,7 @@
             <a:fld id="{57E0CF6C-748E-4B7A-BC8B-3011EF78ED13}" type="datetime1">
               <a:rPr lang="en-US" smtClean="0"/>
               <a:pPr/>
-              <a:t>3/2/2021</a:t>
+              <a:t>4/21/2021</a:t>
             </a:fld>
             <a:endParaRPr lang="en-US" dirty="0"/>
           </a:p>

</xml_diff>